<commit_message>
Tweak to presentation and corrected fatal case error on keystore filename
</commit_message>
<xml_diff>
--- a/docs/Forward Secrecy in Java.pptx
+++ b/docs/Forward Secrecy in Java.pptx
@@ -39666,11 +39666,7 @@
           <a:p>
             <a:r>
               <a:rPr lang="en-GB" dirty="0" smtClean="0"/>
-              <a:t>Code, Document </a:t>
-            </a:r>
-            <a:r>
-              <a:rPr lang="en-GB" smtClean="0"/>
-              <a:t>&amp; Presentation</a:t>
+              <a:t>Code, Document &amp; Presentation</a:t>
             </a:r>
             <a:endParaRPr lang="en-GB" dirty="0" smtClean="0"/>
           </a:p>
@@ -39707,7 +39703,11 @@
           <a:p>
             <a:r>
               <a:rPr lang="en-GB" dirty="0" smtClean="0"/>
-              <a:t>Where’s the code?</a:t>
+              <a:t>Forward </a:t>
+            </a:r>
+            <a:r>
+              <a:rPr lang="en-GB" smtClean="0"/>
+              <a:t>Secrecy Downloads</a:t>
             </a:r>
             <a:endParaRPr lang="en-GB" dirty="0"/>
           </a:p>

</xml_diff>